<commit_message>
Update UIDiagram and DG
</commit_message>
<xml_diff>
--- a/docs/diagrams/UIClassDiagram.pptx
+++ b/docs/diagrams/UIClassDiagram.pptx
@@ -104,6 +104,11 @@
       </a:defRPr>
     </a:lvl9pPr>
   </p:defaultTextStyle>
+  <p:extLst>
+    <p:ext uri="{EFAFB233-063F-42B5-8137-9DF3F51BA10A}">
+      <p15:sldGuideLst xmlns:p15="http://schemas.microsoft.com/office/powerpoint/2012/main"/>
+    </p:ext>
+  </p:extLst>
 </p:presentation>
 </file>
 
@@ -4574,7 +4579,7 @@
         <p:spPr>
           <a:xfrm>
             <a:off x="4861095" y="93220"/>
-            <a:ext cx="1120605" cy="369332"/>
+            <a:ext cx="3293092" cy="369332"/>
           </a:xfrm>
           <a:prstGeom prst="rect">
             <a:avLst/>
@@ -4589,7 +4594,7 @@
           <a:p>
             <a:r>
               <a:rPr lang="en-US" dirty="0"/>
-              <a:t>creates</a:t>
+              <a:t> refresh timetable with new data </a:t>
             </a:r>
           </a:p>
         </p:txBody>

</xml_diff>